<commit_message>
docs: add instructions in notebook
</commit_message>
<xml_diff>
--- a/Data/New_Lindbladian.pptx
+++ b/Data/New_Lindbladian.pptx
@@ -513,6 +513,31 @@
               <a:rPr lang="en-US" dirty="0"/>
               <a:t>7 April – new model</a:t>
             </a:r>
+          </a:p>
+          <a:p>
+            <a:r>
+              <a:rPr lang="en-US" dirty="0"/>
+              <a:t>Used Gunnar’s function to generate Gamma matrix and the </a:t>
+            </a:r>
+            <a:r>
+              <a:rPr lang="en-US" dirty="0" err="1"/>
+              <a:t>Pj</a:t>
+            </a:r>
+            <a:r>
+              <a:rPr lang="en-US" dirty="0"/>
+              <a:t> suggestions</a:t>
+            </a:r>
+          </a:p>
+          <a:p>
+            <a:r>
+              <a:rPr lang="en-US" dirty="0"/>
+              <a:t>4 number </a:t>
+            </a:r>
+            <a:r>
+              <a:rPr lang="en-US"/>
+              <a:t>of states</a:t>
+            </a:r>
+            <a:endParaRPr lang="en-US" dirty="0"/>
           </a:p>
         </p:txBody>
       </p:sp>

</xml_diff>

<commit_message>
STARS poster and document
</commit_message>
<xml_diff>
--- a/Data/New_Lindbladian.pptx
+++ b/Data/New_Lindbladian.pptx
@@ -5,10 +5,11 @@
     <p:sldMasterId id="2147483648" r:id="rId1"/>
   </p:sldMasterIdLst>
   <p:notesMasterIdLst>
-    <p:notesMasterId r:id="rId3"/>
+    <p:notesMasterId r:id="rId4"/>
   </p:notesMasterIdLst>
   <p:sldIdLst>
     <p:sldId id="258" r:id="rId2"/>
+    <p:sldId id="259" r:id="rId3"/>
   </p:sldIdLst>
   <p:sldSz cx="12192000" cy="6858000"/>
   <p:notesSz cx="6858000" cy="9144000"/>
@@ -531,13 +532,8 @@
           <a:p>
             <a:r>
               <a:rPr lang="en-US" dirty="0"/>
-              <a:t>4 number </a:t>
-            </a:r>
-            <a:r>
-              <a:rPr lang="en-US"/>
-              <a:t>of states</a:t>
-            </a:r>
-            <a:endParaRPr lang="en-US" dirty="0"/>
+              <a:t>4 number of states</a:t>
+            </a:r>
           </a:p>
         </p:txBody>
       </p:sp>
@@ -4015,10 +4011,187 @@
           </a:p>
         </p:txBody>
       </p:sp>
+      <p:sp>
+        <p:nvSpPr>
+          <p:cNvPr id="6" name="TextBox 5">
+            <a:extLst>
+              <a:ext uri="{FF2B5EF4-FFF2-40B4-BE49-F238E27FC236}">
+                <a16:creationId xmlns:a16="http://schemas.microsoft.com/office/drawing/2014/main" id="{478622F8-B682-1F42-ACA9-2818B42D4635}"/>
+              </a:ext>
+            </a:extLst>
+          </p:cNvPr>
+          <p:cNvSpPr txBox="1"/>
+          <p:nvPr/>
+        </p:nvSpPr>
+        <p:spPr>
+          <a:xfrm>
+            <a:off x="545792" y="6333589"/>
+            <a:ext cx="10835888" cy="369332"/>
+          </a:xfrm>
+          <a:prstGeom prst="rect">
+            <a:avLst/>
+          </a:prstGeom>
+          <a:noFill/>
+        </p:spPr>
+        <p:txBody>
+          <a:bodyPr wrap="square">
+            <a:spAutoFit/>
+          </a:bodyPr>
+          <a:lstStyle/>
+          <a:p>
+            <a:r>
+              <a:rPr lang="en-US" dirty="0">
+                <a:hlinkClick r:id="rId5"/>
+              </a:rPr>
+              <a:t>https://github.com/GryphonTorch/Quantum/blob/master/Open%20system%20Lindbladian%20simulation.ipynb</a:t>
+            </a:r>
+            <a:r>
+              <a:rPr lang="en-US" dirty="0"/>
+              <a:t> </a:t>
+            </a:r>
+          </a:p>
+        </p:txBody>
+      </p:sp>
     </p:spTree>
     <p:extLst>
       <p:ext uri="{BB962C8B-B14F-4D97-AF65-F5344CB8AC3E}">
         <p14:creationId xmlns:p14="http://schemas.microsoft.com/office/powerpoint/2010/main" val="4207952581"/>
+      </p:ext>
+    </p:extLst>
+  </p:cSld>
+  <p:clrMapOvr>
+    <a:masterClrMapping/>
+  </p:clrMapOvr>
+</p:sld>
+</file>
+
+<file path=ppt/slides/slide2.xml><?xml version="1.0" encoding="utf-8"?>
+<p:sld xmlns:a="http://schemas.openxmlformats.org/drawingml/2006/main" xmlns:r="http://schemas.openxmlformats.org/officeDocument/2006/relationships" xmlns:p="http://schemas.openxmlformats.org/presentationml/2006/main">
+  <p:cSld>
+    <p:spTree>
+      <p:nvGrpSpPr>
+        <p:cNvPr id="1" name=""/>
+        <p:cNvGrpSpPr/>
+        <p:nvPr/>
+      </p:nvGrpSpPr>
+      <p:grpSpPr>
+        <a:xfrm>
+          <a:off x="0" y="0"/>
+          <a:ext cx="0" cy="0"/>
+          <a:chOff x="0" y="0"/>
+          <a:chExt cx="0" cy="0"/>
+        </a:xfrm>
+      </p:grpSpPr>
+      <p:pic>
+        <p:nvPicPr>
+          <p:cNvPr id="2050" name="Picture 2">
+            <a:extLst>
+              <a:ext uri="{FF2B5EF4-FFF2-40B4-BE49-F238E27FC236}">
+                <a16:creationId xmlns:a16="http://schemas.microsoft.com/office/drawing/2014/main" id="{EC5C3200-551E-1E51-3165-930DD4CCC5CC}"/>
+              </a:ext>
+            </a:extLst>
+          </p:cNvPr>
+          <p:cNvPicPr>
+            <a:picLocks noChangeAspect="1" noChangeArrowheads="1"/>
+          </p:cNvPicPr>
+          <p:nvPr/>
+        </p:nvPicPr>
+        <p:blipFill>
+          <a:blip r:embed="rId2">
+            <a:extLst>
+              <a:ext uri="{28A0092B-C50C-407E-A947-70E740481C1C}">
+                <a14:useLocalDpi xmlns:a14="http://schemas.microsoft.com/office/drawing/2010/main" val="0"/>
+              </a:ext>
+            </a:extLst>
+          </a:blip>
+          <a:srcRect/>
+          <a:stretch>
+            <a:fillRect/>
+          </a:stretch>
+        </p:blipFill>
+        <p:spPr bwMode="auto">
+          <a:xfrm>
+            <a:off x="978833" y="883878"/>
+            <a:ext cx="4470026" cy="3405734"/>
+          </a:xfrm>
+          <a:prstGeom prst="rect">
+            <a:avLst/>
+          </a:prstGeom>
+          <a:noFill/>
+          <a:extLst>
+            <a:ext uri="{909E8E84-426E-40DD-AFC4-6F175D3DCCD1}">
+              <a14:hiddenFill xmlns:a14="http://schemas.microsoft.com/office/drawing/2010/main">
+                <a:solidFill>
+                  <a:srgbClr val="FFFFFF"/>
+                </a:solidFill>
+              </a14:hiddenFill>
+            </a:ext>
+          </a:extLst>
+        </p:spPr>
+      </p:pic>
+      <p:sp>
+        <p:nvSpPr>
+          <p:cNvPr id="4" name="TextBox 3">
+            <a:extLst>
+              <a:ext uri="{FF2B5EF4-FFF2-40B4-BE49-F238E27FC236}">
+                <a16:creationId xmlns:a16="http://schemas.microsoft.com/office/drawing/2014/main" id="{47C7B469-A868-C561-3219-899A70CBB115}"/>
+              </a:ext>
+            </a:extLst>
+          </p:cNvPr>
+          <p:cNvSpPr txBox="1"/>
+          <p:nvPr/>
+        </p:nvSpPr>
+        <p:spPr>
+          <a:xfrm>
+            <a:off x="1223682" y="4693024"/>
+            <a:ext cx="4329953" cy="923330"/>
+          </a:xfrm>
+          <a:prstGeom prst="rect">
+            <a:avLst/>
+          </a:prstGeom>
+          <a:noFill/>
+        </p:spPr>
+        <p:txBody>
+          <a:bodyPr wrap="square" rtlCol="0">
+            <a:spAutoFit/>
+          </a:bodyPr>
+          <a:lstStyle/>
+          <a:p>
+            <a:r>
+              <a:rPr lang="en-US" dirty="0"/>
+              <a:t>Probabilities </a:t>
+            </a:r>
+            <a:r>
+              <a:rPr lang="en-US" dirty="0" err="1"/>
+              <a:t>Pj</a:t>
+            </a:r>
+            <a:r>
+              <a:rPr lang="en-US" dirty="0"/>
+              <a:t> set as [0.1, 0.4, 0.4, 0.1] using </a:t>
+            </a:r>
+            <a:r>
+              <a:rPr lang="en-US" dirty="0" err="1"/>
+              <a:t>Kvam</a:t>
+            </a:r>
+            <a:r>
+              <a:rPr lang="en-US" dirty="0"/>
+              <a:t> et al. paper </a:t>
+            </a:r>
+            <a:r>
+              <a:rPr lang="en-US" dirty="0" err="1"/>
+              <a:t>Lindbladian</a:t>
+            </a:r>
+            <a:r>
+              <a:rPr lang="en-US" dirty="0"/>
+              <a:t>. Looks like a faster inversion?</a:t>
+            </a:r>
+          </a:p>
+        </p:txBody>
+      </p:sp>
+    </p:spTree>
+    <p:extLst>
+      <p:ext uri="{BB962C8B-B14F-4D97-AF65-F5344CB8AC3E}">
+        <p14:creationId xmlns:p14="http://schemas.microsoft.com/office/powerpoint/2010/main" val="2642905094"/>
       </p:ext>
     </p:extLst>
   </p:cSld>

</xml_diff>